<commit_message>
approach failed, thinking about what to do instead
</commit_message>
<xml_diff>
--- a/slides.pptx
+++ b/slides.pptx
@@ -3124,7 +3124,6 @@
               <a:rPr lang="en-US" dirty="0"/>
               <a:t>A Link between Degrees of Freedom and VC-Dimension</a:t>
             </a:r>
-            <a:endParaRPr lang="en-US" dirty="0"/>
           </a:p>
         </p:txBody>
       </p:sp>
@@ -3143,6 +3142,10 @@
           <a:bodyPr/>
           <a:lstStyle/>
           <a:p>
+            <a:r>
+              <a:rPr lang="en-US" dirty="0" smtClean="0"/>
+              <a:t>By Dan Simon</a:t>
+            </a:r>
             <a:endParaRPr lang="en-US" dirty="0"/>
           </a:p>
         </p:txBody>
@@ -3334,7 +3337,6 @@
               <a:rPr lang="en-US" dirty="0"/>
               <a:t>. VC dimension of ellipsoids, 2011. </a:t>
             </a:r>
-            <a:endParaRPr lang="en-US" dirty="0"/>
           </a:p>
           <a:p>
             <a:r>
@@ -3397,7 +3399,6 @@
               <a:rPr lang="en-US" dirty="0"/>
               <a:t>:929–965, 1989. </a:t>
             </a:r>
-            <a:endParaRPr lang="en-US" dirty="0"/>
           </a:p>
           <a:p>
             <a:r>
@@ -3428,7 +3429,6 @@
               <a:rPr lang="en-US" dirty="0"/>
               <a:t>, 31:306–308, 1979. </a:t>
             </a:r>
-            <a:endParaRPr lang="en-US" dirty="0"/>
           </a:p>
           <a:p>
             <a:r>
@@ -3447,7 +3447,6 @@
               <a:rPr lang="en-US" dirty="0"/>
               <a:t>. Foundations of Machine Learning, Fall 2016. </a:t>
             </a:r>
-            <a:endParaRPr lang="en-US" dirty="0"/>
           </a:p>
           <a:p>
             <a:endParaRPr lang="en-US" dirty="0"/>

</xml_diff>